<commit_message>
updates on lit review
</commit_message>
<xml_diff>
--- a/latex-thesis/figures.pptx
+++ b/latex-thesis/figures.pptx
@@ -10071,14 +10071,14 @@
           <p:nvPr>
             <p:extLst>
               <p:ext uri="{D42A27DB-BD31-4B8C-83A1-F6EECF244321}">
-                <p14:modId xmlns:p14="http://schemas.microsoft.com/office/powerpoint/2010/main" val="454414916"/>
+                <p14:modId xmlns:p14="http://schemas.microsoft.com/office/powerpoint/2010/main" val="374828449"/>
               </p:ext>
             </p:extLst>
           </p:nvPr>
         </p:nvGraphicFramePr>
         <p:xfrm>
-          <a:off x="769251" y="1726795"/>
-          <a:ext cx="8387449" cy="3337560"/>
+          <a:off x="1480451" y="151995"/>
+          <a:ext cx="8387449" cy="4282440"/>
         </p:xfrm>
         <a:graphic>
           <a:graphicData uri="http://schemas.openxmlformats.org/drawingml/2006/table">
@@ -10101,10 +10101,10 @@
                     <a:p>
                       <a:pPr algn="ctr"/>
                       <a:r>
-                        <a:rPr lang="en-AU" sz="1200" smtClean="0"/>
+                        <a:rPr lang="en-AU" sz="1200" dirty="0" smtClean="0"/>
                         <a:t>Model</a:t>
                       </a:r>
-                      <a:endParaRPr lang="en-AU" sz="1200"/>
+                      <a:endParaRPr lang="en-AU" sz="1200" dirty="0"/>
                     </a:p>
                   </a:txBody>
                   <a:tcPr>
@@ -10137,10 +10137,10 @@
                     <a:p>
                       <a:pPr algn="ctr"/>
                       <a:r>
-                        <a:rPr lang="en-AU" sz="1200" smtClean="0"/>
-                        <a:t>Characteristics</a:t>
+                        <a:rPr lang="en-AU" sz="1200" dirty="0" smtClean="0"/>
+                        <a:t>Model characteristics</a:t>
                       </a:r>
-                      <a:endParaRPr lang="en-AU" sz="1200"/>
+                      <a:endParaRPr lang="en-AU" sz="1200" dirty="0"/>
                     </a:p>
                   </a:txBody>
                   <a:tcPr>
@@ -10173,12 +10173,12 @@
                     <a:p>
                       <a:pPr algn="ctr"/>
                       <a:r>
-                        <a:rPr lang="en-AU" sz="1200" dirty="0" smtClean="0"/>
-                        <a:t>Input </a:t>
+                        <a:rPr lang="en-AU" sz="1200" baseline="0" smtClean="0"/>
+                        <a:t>Data </a:t>
                       </a:r>
                       <a:r>
                         <a:rPr lang="en-AU" sz="1200" baseline="0" dirty="0" smtClean="0"/>
-                        <a:t>data</a:t>
+                        <a:t>characteristics</a:t>
                       </a:r>
                       <a:endParaRPr lang="en-AU" sz="1200" dirty="0" smtClean="0"/>
                     </a:p>
@@ -10405,7 +10405,7 @@
                     <a:bodyPr/>
                     <a:lstStyle/>
                     <a:p>
-                      <a:endParaRPr lang="en-AU" sz="1100"/>
+                      <a:endParaRPr lang="en-AU" sz="1100" dirty="0"/>
                     </a:p>
                   </a:txBody>
                   <a:tcPr>
@@ -10505,7 +10505,33 @@
                     <a:bodyPr/>
                     <a:lstStyle/>
                     <a:p>
-                      <a:endParaRPr lang="en-AU" sz="1100"/>
+                      <a:pPr marL="171450" indent="-171450">
+                        <a:buFont typeface="Arial" charset="0"/>
+                        <a:buChar char="•"/>
+                      </a:pPr>
+                      <a:r>
+                        <a:rPr lang="en-AU" sz="1100" dirty="0" smtClean="0"/>
+                        <a:t>focus</a:t>
+                      </a:r>
+                      <a:r>
+                        <a:rPr lang="en-AU" sz="1100" baseline="0" dirty="0" smtClean="0"/>
+                        <a:t> on mean, miss the extremes</a:t>
+                      </a:r>
+                      <a:endParaRPr lang="en-AU" sz="1100" dirty="0" smtClean="0"/>
+                    </a:p>
+                    <a:p>
+                      <a:pPr marL="171450" indent="-171450">
+                        <a:buFont typeface="Arial" charset="0"/>
+                        <a:buChar char="•"/>
+                      </a:pPr>
+                      <a:r>
+                        <a:rPr lang="en-AU" sz="1100" dirty="0" smtClean="0"/>
+                        <a:t>sensitive</a:t>
+                      </a:r>
+                      <a:r>
+                        <a:rPr lang="en-AU" sz="1100" baseline="0" dirty="0" smtClean="0"/>
+                        <a:t> to missing data</a:t>
+                      </a:r>
                     </a:p>
                   </a:txBody>
                   <a:tcPr/>
@@ -10518,12 +10544,8 @@
                     <a:lstStyle/>
                     <a:p>
                       <a:r>
-                        <a:rPr lang="en-AU" sz="1100" dirty="0" err="1" smtClean="0"/>
-                        <a:t>Kalman</a:t>
-                      </a:r>
-                      <a:r>
                         <a:rPr lang="en-AU" sz="1100" dirty="0" smtClean="0"/>
-                        <a:t> filtering</a:t>
+                        <a:t>Kalman filtering</a:t>
                       </a:r>
                       <a:endParaRPr lang="en-AU" sz="1100" dirty="0"/>
                     </a:p>
@@ -10624,14 +10646,38 @@
                         <a:buChar char="•"/>
                       </a:pPr>
                       <a:r>
-                        <a:rPr lang="en-AU" sz="1100" smtClean="0"/>
+                        <a:rPr lang="en-AU" sz="1100" dirty="0" smtClean="0"/>
                         <a:t>simple</a:t>
                       </a:r>
                       <a:r>
-                        <a:rPr lang="en-AU" sz="1100" baseline="0" smtClean="0"/>
-                        <a:t> model structure</a:t>
+                        <a:rPr lang="en-AU" sz="1100" baseline="0" dirty="0" smtClean="0"/>
+                        <a:t> model </a:t>
                       </a:r>
-                      <a:endParaRPr lang="en-AU" sz="1100"/>
+                      <a:r>
+                        <a:rPr lang="en-AU" sz="1100" baseline="0" dirty="0" smtClean="0"/>
+                        <a:t>structure</a:t>
+                      </a:r>
+                    </a:p>
+                    <a:p>
+                      <a:pPr marL="171450" indent="-171450">
+                        <a:buFont typeface="Arial" charset="0"/>
+                        <a:buChar char="•"/>
+                      </a:pPr>
+                      <a:r>
+                        <a:rPr lang="en-AU" sz="1100" baseline="0" dirty="0" smtClean="0"/>
+                        <a:t>multivariate modelling</a:t>
+                      </a:r>
+                    </a:p>
+                    <a:p>
+                      <a:pPr marL="171450" indent="-171450">
+                        <a:buFont typeface="Arial" charset="0"/>
+                        <a:buChar char="•"/>
+                      </a:pPr>
+                      <a:r>
+                        <a:rPr lang="en-AU" sz="1100" baseline="0" dirty="0" smtClean="0"/>
+                        <a:t>robustness to missing data</a:t>
+                      </a:r>
+                      <a:endParaRPr lang="en-AU" sz="1100" dirty="0"/>
                     </a:p>
                   </a:txBody>
                   <a:tcPr/>
@@ -10641,7 +10687,7 @@
                     <a:bodyPr/>
                     <a:lstStyle/>
                     <a:p>
-                      <a:endParaRPr lang="en-AU" sz="1100"/>
+                      <a:endParaRPr lang="en-AU" sz="1100" dirty="0"/>
                     </a:p>
                   </a:txBody>
                   <a:tcPr/>
@@ -10692,7 +10738,7 @@
                         <a:buChar char="•"/>
                       </a:pPr>
                       <a:r>
-                        <a:rPr lang="en-AU" sz="1100" smtClean="0"/>
+                        <a:rPr lang="en-AU" sz="1100" dirty="0" smtClean="0"/>
                         <a:t>able to map complex tempo-spatial relationships</a:t>
                       </a:r>
                     </a:p>
@@ -10702,11 +10748,11 @@
                         <a:buChar char="•"/>
                       </a:pPr>
                       <a:r>
-                        <a:rPr lang="en-AU" sz="1100" smtClean="0"/>
+                        <a:rPr lang="en-AU" sz="1100" dirty="0" smtClean="0"/>
                         <a:t>multivariate</a:t>
                       </a:r>
                       <a:r>
-                        <a:rPr lang="en-AU" sz="1100" baseline="0" smtClean="0"/>
+                        <a:rPr lang="en-AU" sz="1100" baseline="0" dirty="0" smtClean="0"/>
                         <a:t> modelling</a:t>
                       </a:r>
                     </a:p>
@@ -10716,9 +10762,67 @@
                         <a:buChar char="•"/>
                       </a:pPr>
                       <a:r>
-                        <a:rPr lang="en-AU" sz="1100" baseline="0" smtClean="0"/>
-                        <a:t>accurate multistep-ahead predictions</a:t>
+                        <a:rPr lang="en-AU" sz="1100" baseline="0" dirty="0" smtClean="0"/>
+                        <a:t>accurate multistep-ahead </a:t>
                       </a:r>
+                      <a:r>
+                        <a:rPr lang="en-AU" sz="1100" baseline="0" dirty="0" smtClean="0"/>
+                        <a:t>predictions</a:t>
+                      </a:r>
+                    </a:p>
+                    <a:p>
+                      <a:pPr marL="171450" indent="-171450">
+                        <a:buFont typeface="Arial" charset="0"/>
+                        <a:buChar char="•"/>
+                      </a:pPr>
+                      <a:r>
+                        <a:rPr lang="en-AU" sz="1100" baseline="0" dirty="0" smtClean="0"/>
+                        <a:t>robustness to missing data</a:t>
+                      </a:r>
+                      <a:endParaRPr lang="en-AU" sz="1100" dirty="0"/>
+                    </a:p>
+                  </a:txBody>
+                  <a:tcPr/>
+                </a:tc>
+                <a:tc>
+                  <a:txBody>
+                    <a:bodyPr/>
+                    <a:lstStyle/>
+                    <a:p>
+                      <a:r>
+                        <a:rPr lang="en-AU" sz="1100" dirty="0" smtClean="0"/>
+                        <a:t>data and computation </a:t>
+                      </a:r>
+                      <a:r>
+                        <a:rPr lang="en-AU" sz="1100" dirty="0" smtClean="0"/>
+                        <a:t>intensive</a:t>
+                      </a:r>
+                      <a:endParaRPr lang="en-AU" sz="1100" dirty="0"/>
+                    </a:p>
+                  </a:txBody>
+                  <a:tcPr/>
+                </a:tc>
+              </a:tr>
+              <a:tr h="0">
+                <a:tc>
+                  <a:txBody>
+                    <a:bodyPr/>
+                    <a:lstStyle/>
+                    <a:p>
+                      <a:r>
+                        <a:rPr lang="en-AU" sz="1100" dirty="0" smtClean="0"/>
+                        <a:t>Bayesian networks</a:t>
+                      </a:r>
+                      <a:endParaRPr lang="en-AU" sz="1100" dirty="0"/>
+                    </a:p>
+                  </a:txBody>
+                  <a:tcPr/>
+                </a:tc>
+                <a:tc>
+                  <a:txBody>
+                    <a:bodyPr/>
+                    <a:lstStyle/>
+                    <a:p>
                       <a:endParaRPr lang="en-AU" sz="1100"/>
                     </a:p>
                   </a:txBody>
@@ -10729,11 +10833,39 @@
                     <a:bodyPr/>
                     <a:lstStyle/>
                     <a:p>
+                      <a:endParaRPr lang="en-AU" sz="1100"/>
+                    </a:p>
+                  </a:txBody>
+                  <a:tcPr/>
+                </a:tc>
+                <a:tc>
+                  <a:txBody>
+                    <a:bodyPr/>
+                    <a:lstStyle/>
+                    <a:p>
+                      <a:pPr marL="171450" indent="-171450">
+                        <a:buFont typeface="Arial" charset="0"/>
+                        <a:buChar char="•"/>
+                      </a:pPr>
                       <a:r>
-                        <a:rPr lang="en-AU" sz="1100" smtClean="0"/>
-                        <a:t>data intensive</a:t>
+                        <a:rPr lang="en-AU" sz="1100" dirty="0" smtClean="0"/>
+                        <a:t>multivariate</a:t>
                       </a:r>
-                      <a:endParaRPr lang="en-AU" sz="1100"/>
+                      <a:r>
+                        <a:rPr lang="en-AU" sz="1100" baseline="0" dirty="0" smtClean="0"/>
+                        <a:t> modelling</a:t>
+                      </a:r>
+                      <a:endParaRPr lang="en-AU" sz="1100" dirty="0"/>
+                    </a:p>
+                  </a:txBody>
+                  <a:tcPr/>
+                </a:tc>
+                <a:tc>
+                  <a:txBody>
+                    <a:bodyPr/>
+                    <a:lstStyle/>
+                    <a:p>
+                      <a:endParaRPr lang="en-AU" sz="1100" dirty="0"/>
                     </a:p>
                   </a:txBody>
                   <a:tcPr/>
@@ -10850,13 +10982,13 @@
             <p:ph idx="1"/>
             <p:extLst>
               <p:ext uri="{D42A27DB-BD31-4B8C-83A1-F6EECF244321}">
-                <p14:modId xmlns:p14="http://schemas.microsoft.com/office/powerpoint/2010/main" val="841021650"/>
+                <p14:modId xmlns:p14="http://schemas.microsoft.com/office/powerpoint/2010/main" val="2108501481"/>
               </p:ext>
             </p:extLst>
           </p:nvPr>
         </p:nvGraphicFramePr>
         <p:xfrm>
-          <a:off x="775504" y="1825625"/>
+          <a:off x="1194604" y="492125"/>
           <a:ext cx="8417248" cy="3657600"/>
         </p:xfrm>
         <a:graphic>
@@ -10902,7 +11034,7 @@
                         <a:defRPr/>
                       </a:pPr>
                       <a:r>
-                        <a:rPr lang="en-US" sz="1200" b="1" kern="1200" smtClean="0">
+                        <a:rPr lang="en-US" sz="1200" b="1" kern="1200" dirty="0" smtClean="0">
                           <a:solidFill>
                             <a:schemeClr val="bg1">
                               <a:lumMod val="95000"/>
@@ -10915,7 +11047,7 @@
                         </a:rPr>
                         <a:t>Model</a:t>
                       </a:r>
-                      <a:endParaRPr lang="en-AU" sz="1200">
+                      <a:endParaRPr lang="en-AU" sz="1200" dirty="0">
                         <a:solidFill>
                           <a:schemeClr val="bg1">
                             <a:lumMod val="95000"/>

</xml_diff>